<commit_message>
MG: continue graph draft
</commit_message>
<xml_diff>
--- a/docs/Design/SoftArchitecture/MG_graph_draft.pptx
+++ b/docs/Design/SoftArchitecture/MG_graph_draft.pptx
@@ -3546,7 +3546,7 @@
         <p:spPr>
           <a:xfrm>
             <a:off x="3050047" y="1346794"/>
-            <a:ext cx="7923570" cy="2253990"/>
+            <a:ext cx="1003308" cy="1900888"/>
           </a:xfrm>
           <a:prstGeom prst="straightConnector1">
             <a:avLst/>
@@ -3676,7 +3676,7 @@
         <p:spPr>
           <a:xfrm>
             <a:off x="5256946" y="1332498"/>
-            <a:ext cx="233420" cy="2373693"/>
+            <a:ext cx="2087182" cy="2705186"/>
           </a:xfrm>
           <a:prstGeom prst="straightConnector1">
             <a:avLst/>
@@ -3716,9 +3716,9 @@
           <p:nvPr/>
         </p:nvCxnSpPr>
         <p:spPr>
-          <a:xfrm flipH="1">
-            <a:off x="2364529" y="1332498"/>
-            <a:ext cx="2892417" cy="3132942"/>
+          <a:xfrm>
+            <a:off x="5256946" y="1332498"/>
+            <a:ext cx="1316230" cy="2069568"/>
           </a:xfrm>
           <a:prstGeom prst="straightConnector1">
             <a:avLst/>
@@ -3848,7 +3848,7 @@
         <p:spPr>
           <a:xfrm>
             <a:off x="5256946" y="1332498"/>
-            <a:ext cx="2771785" cy="2052295"/>
+            <a:ext cx="1541163" cy="1167927"/>
           </a:xfrm>
           <a:prstGeom prst="straightConnector1">
             <a:avLst/>
@@ -3888,9 +3888,9 @@
           <p:nvPr/>
         </p:nvCxnSpPr>
         <p:spPr>
-          <a:xfrm>
-            <a:off x="5256946" y="1332498"/>
-            <a:ext cx="5716671" cy="2268286"/>
+          <a:xfrm flipH="1">
+            <a:off x="4053355" y="1332498"/>
+            <a:ext cx="1203591" cy="1915184"/>
           </a:xfrm>
           <a:prstGeom prst="straightConnector1">
             <a:avLst/>
@@ -3931,8 +3931,8 @@
         </p:nvCxnSpPr>
         <p:spPr>
           <a:xfrm flipH="1">
-            <a:off x="2364529" y="1332498"/>
-            <a:ext cx="7736332" cy="3132942"/>
+            <a:off x="6573176" y="1332498"/>
+            <a:ext cx="3527685" cy="2069568"/>
           </a:xfrm>
           <a:prstGeom prst="straightConnector1">
             <a:avLst/>
@@ -3972,9 +3972,9 @@
           <p:nvPr/>
         </p:nvCxnSpPr>
         <p:spPr>
-          <a:xfrm>
-            <a:off x="10100861" y="1332498"/>
-            <a:ext cx="872756" cy="2268286"/>
+          <a:xfrm flipH="1">
+            <a:off x="4053355" y="1332498"/>
+            <a:ext cx="6047506" cy="1915184"/>
           </a:xfrm>
           <a:prstGeom prst="straightConnector1">
             <a:avLst/>
@@ -4015,8 +4015,8 @@
         </p:nvCxnSpPr>
         <p:spPr>
           <a:xfrm flipH="1">
-            <a:off x="5490366" y="1332498"/>
-            <a:ext cx="4610495" cy="2373693"/>
+            <a:off x="7344128" y="1332498"/>
+            <a:ext cx="2756733" cy="2705186"/>
           </a:xfrm>
           <a:prstGeom prst="straightConnector1">
             <a:avLst/>
@@ -4057,8 +4057,8 @@
         </p:nvCxnSpPr>
         <p:spPr>
           <a:xfrm flipH="1">
-            <a:off x="8028731" y="1332498"/>
-            <a:ext cx="2072130" cy="2052295"/>
+            <a:off x="6798109" y="1332498"/>
+            <a:ext cx="3302752" cy="1167927"/>
           </a:xfrm>
           <a:prstGeom prst="straightConnector1">
             <a:avLst/>
@@ -4096,7 +4096,7 @@
         </p:nvSpPr>
         <p:spPr>
           <a:xfrm>
-            <a:off x="6744083" y="1442986"/>
+            <a:off x="6728941" y="1527553"/>
             <a:ext cx="1024255" cy="369332"/>
           </a:xfrm>
           <a:prstGeom prst="rect">
@@ -4143,8 +4143,8 @@
         </p:nvCxnSpPr>
         <p:spPr>
           <a:xfrm flipH="1">
-            <a:off x="7768338" y="1332498"/>
-            <a:ext cx="2332523" cy="295154"/>
+            <a:off x="7753196" y="1332498"/>
+            <a:ext cx="2347665" cy="379721"/>
           </a:xfrm>
           <a:prstGeom prst="straightConnector1">
             <a:avLst/>
@@ -4185,8 +4185,8 @@
         </p:nvCxnSpPr>
         <p:spPr>
           <a:xfrm flipH="1">
-            <a:off x="9864052" y="1332498"/>
-            <a:ext cx="236809" cy="3317608"/>
+            <a:off x="9962768" y="1332498"/>
+            <a:ext cx="138093" cy="3136860"/>
           </a:xfrm>
           <a:prstGeom prst="straightConnector1">
             <a:avLst/>
@@ -4224,7 +4224,7 @@
         </p:nvSpPr>
         <p:spPr>
           <a:xfrm>
-            <a:off x="4652042" y="4724188"/>
+            <a:off x="5631782" y="5064954"/>
             <a:ext cx="2245615" cy="369332"/>
           </a:xfrm>
           <a:prstGeom prst="rect">
@@ -4274,7 +4274,7 @@
         <p:spPr>
           <a:xfrm>
             <a:off x="1151225" y="3217400"/>
-            <a:ext cx="4623625" cy="1506788"/>
+            <a:ext cx="5603365" cy="1847554"/>
           </a:xfrm>
           <a:prstGeom prst="straightConnector1">
             <a:avLst/>
@@ -4315,8 +4315,8 @@
         </p:nvCxnSpPr>
         <p:spPr>
           <a:xfrm flipH="1">
-            <a:off x="5774850" y="1812318"/>
-            <a:ext cx="1481361" cy="2911870"/>
+            <a:off x="6754590" y="1896885"/>
+            <a:ext cx="486479" cy="3168069"/>
           </a:xfrm>
           <a:prstGeom prst="straightConnector1">
             <a:avLst/>
@@ -4357,9 +4357,9 @@
           <p:nvPr/>
         </p:nvCxnSpPr>
         <p:spPr>
-          <a:xfrm flipH="1" flipV="1">
-            <a:off x="5774850" y="4724188"/>
-            <a:ext cx="3245862" cy="110584"/>
+          <a:xfrm flipH="1">
+            <a:off x="6754590" y="4654024"/>
+            <a:ext cx="2364838" cy="410930"/>
           </a:xfrm>
           <a:prstGeom prst="straightConnector1">
             <a:avLst/>
@@ -4394,15 +4394,15 @@
           </p:cNvPr>
           <p:cNvCxnSpPr>
             <a:cxnSpLocks/>
-            <a:stCxn id="10" idx="1"/>
+            <a:stCxn id="10" idx="2"/>
             <a:endCxn id="59" idx="0"/>
           </p:cNvCxnSpPr>
           <p:nvPr/>
         </p:nvCxnSpPr>
         <p:spPr>
-          <a:xfrm flipH="1">
-            <a:off x="5774850" y="3785450"/>
-            <a:ext cx="4268640" cy="938738"/>
+          <a:xfrm>
+            <a:off x="4053355" y="3617014"/>
+            <a:ext cx="2701235" cy="1447940"/>
           </a:xfrm>
           <a:prstGeom prst="straightConnector1">
             <a:avLst/>
@@ -4443,8 +4443,8 @@
         </p:nvCxnSpPr>
         <p:spPr>
           <a:xfrm flipH="1">
-            <a:off x="5774850" y="1332498"/>
-            <a:ext cx="4326011" cy="3391690"/>
+            <a:off x="6754590" y="1332498"/>
+            <a:ext cx="3346271" cy="3732456"/>
           </a:xfrm>
           <a:prstGeom prst="straightConnector1">
             <a:avLst/>
@@ -4470,10 +4470,10 @@
       </p:cxnSp>
       <p:sp>
         <p:nvSpPr>
-          <p:cNvPr id="8" name="TextBox 7">
-            <a:extLst>
-              <a:ext uri="{FF2B5EF4-FFF2-40B4-BE49-F238E27FC236}">
-                <a16:creationId xmlns:a16="http://schemas.microsoft.com/office/drawing/2014/main" id="{0FA67A8B-DEE4-F51D-4AAE-9E9741D0DB4B}"/>
+          <p:cNvPr id="77" name="TextBox 76">
+            <a:extLst>
+              <a:ext uri="{FF2B5EF4-FFF2-40B4-BE49-F238E27FC236}">
+                <a16:creationId xmlns:a16="http://schemas.microsoft.com/office/drawing/2014/main" id="{487E3CD6-2F17-6D6E-EAED-0985948EDFCD}"/>
               </a:ext>
             </a:extLst>
           </p:cNvPr>
@@ -4482,8 +4482,492 @@
         </p:nvSpPr>
         <p:spPr>
           <a:xfrm>
-            <a:off x="1484608" y="4465440"/>
-            <a:ext cx="1759841" cy="369332"/>
+            <a:off x="5615734" y="126378"/>
+            <a:ext cx="1837362" cy="369332"/>
+          </a:xfrm>
+          <a:prstGeom prst="rect">
+            <a:avLst/>
+          </a:prstGeom>
+          <a:solidFill>
+            <a:schemeClr val="tx1"/>
+          </a:solidFill>
+          <a:ln w="28575">
+            <a:solidFill>
+              <a:srgbClr val="00B0F0"/>
+            </a:solidFill>
+          </a:ln>
+        </p:spPr>
+        <p:txBody>
+          <a:bodyPr wrap="none" rtlCol="0">
+            <a:spAutoFit/>
+          </a:bodyPr>
+          <a:lstStyle/>
+          <a:p>
+            <a:r>
+              <a:rPr lang="en-US" dirty="0">
+                <a:solidFill>
+                  <a:schemeClr val="bg1"/>
+                </a:solidFill>
+              </a:rPr>
+              <a:t>[App] </a:t>
+            </a:r>
+            <a:r>
+              <a:rPr lang="en-US" dirty="0" err="1">
+                <a:solidFill>
+                  <a:schemeClr val="bg1"/>
+                </a:solidFill>
+              </a:rPr>
+              <a:t>ImgBeamer</a:t>
+            </a:r>
+            <a:endParaRPr lang="en-CA" dirty="0">
+              <a:solidFill>
+                <a:schemeClr val="bg1"/>
+              </a:solidFill>
+            </a:endParaRPr>
+          </a:p>
+        </p:txBody>
+      </p:sp>
+      <p:cxnSp>
+        <p:nvCxnSpPr>
+          <p:cNvPr id="79" name="Straight Arrow Connector 78">
+            <a:extLst>
+              <a:ext uri="{FF2B5EF4-FFF2-40B4-BE49-F238E27FC236}">
+                <a16:creationId xmlns:a16="http://schemas.microsoft.com/office/drawing/2014/main" id="{33E8FCE5-64E2-1004-74D7-9FD94CBC8C01}"/>
+              </a:ext>
+            </a:extLst>
+          </p:cNvPr>
+          <p:cNvCxnSpPr>
+            <a:stCxn id="77" idx="2"/>
+            <a:endCxn id="5" idx="0"/>
+          </p:cNvCxnSpPr>
+          <p:nvPr/>
+        </p:nvCxnSpPr>
+        <p:spPr>
+          <a:xfrm flipH="1">
+            <a:off x="3050047" y="495710"/>
+            <a:ext cx="3484368" cy="481752"/>
+          </a:xfrm>
+          <a:prstGeom prst="straightConnector1">
+            <a:avLst/>
+          </a:prstGeom>
+          <a:ln>
+            <a:tailEnd type="triangle"/>
+          </a:ln>
+        </p:spPr>
+        <p:style>
+          <a:lnRef idx="1">
+            <a:schemeClr val="accent1"/>
+          </a:lnRef>
+          <a:fillRef idx="0">
+            <a:schemeClr val="accent1"/>
+          </a:fillRef>
+          <a:effectRef idx="0">
+            <a:schemeClr val="accent1"/>
+          </a:effectRef>
+          <a:fontRef idx="minor">
+            <a:schemeClr val="tx1"/>
+          </a:fontRef>
+        </p:style>
+      </p:cxnSp>
+      <p:cxnSp>
+        <p:nvCxnSpPr>
+          <p:cNvPr id="81" name="Straight Arrow Connector 80">
+            <a:extLst>
+              <a:ext uri="{FF2B5EF4-FFF2-40B4-BE49-F238E27FC236}">
+                <a16:creationId xmlns:a16="http://schemas.microsoft.com/office/drawing/2014/main" id="{35D1A7D3-92DE-A190-BDD2-AF306FA3FF0A}"/>
+              </a:ext>
+            </a:extLst>
+          </p:cNvPr>
+          <p:cNvCxnSpPr>
+            <a:stCxn id="77" idx="2"/>
+            <a:endCxn id="6" idx="0"/>
+          </p:cNvCxnSpPr>
+          <p:nvPr/>
+        </p:nvCxnSpPr>
+        <p:spPr>
+          <a:xfrm flipH="1">
+            <a:off x="5256946" y="495710"/>
+            <a:ext cx="1277469" cy="467456"/>
+          </a:xfrm>
+          <a:prstGeom prst="straightConnector1">
+            <a:avLst/>
+          </a:prstGeom>
+          <a:ln>
+            <a:tailEnd type="triangle"/>
+          </a:ln>
+        </p:spPr>
+        <p:style>
+          <a:lnRef idx="1">
+            <a:schemeClr val="accent1"/>
+          </a:lnRef>
+          <a:fillRef idx="0">
+            <a:schemeClr val="accent1"/>
+          </a:fillRef>
+          <a:effectRef idx="0">
+            <a:schemeClr val="accent1"/>
+          </a:effectRef>
+          <a:fontRef idx="minor">
+            <a:schemeClr val="tx1"/>
+          </a:fontRef>
+        </p:style>
+      </p:cxnSp>
+      <p:cxnSp>
+        <p:nvCxnSpPr>
+          <p:cNvPr id="83" name="Straight Arrow Connector 82">
+            <a:extLst>
+              <a:ext uri="{FF2B5EF4-FFF2-40B4-BE49-F238E27FC236}">
+                <a16:creationId xmlns:a16="http://schemas.microsoft.com/office/drawing/2014/main" id="{3B463BD6-F041-2DBF-96F6-6C2D94FB8D52}"/>
+              </a:ext>
+            </a:extLst>
+          </p:cNvPr>
+          <p:cNvCxnSpPr>
+            <a:stCxn id="77" idx="2"/>
+            <a:endCxn id="7" idx="0"/>
+          </p:cNvCxnSpPr>
+          <p:nvPr/>
+        </p:nvCxnSpPr>
+        <p:spPr>
+          <a:xfrm>
+            <a:off x="6534415" y="495710"/>
+            <a:ext cx="3566446" cy="467456"/>
+          </a:xfrm>
+          <a:prstGeom prst="straightConnector1">
+            <a:avLst/>
+          </a:prstGeom>
+          <a:ln>
+            <a:tailEnd type="triangle"/>
+          </a:ln>
+        </p:spPr>
+        <p:style>
+          <a:lnRef idx="1">
+            <a:schemeClr val="accent1"/>
+          </a:lnRef>
+          <a:fillRef idx="0">
+            <a:schemeClr val="accent1"/>
+          </a:fillRef>
+          <a:effectRef idx="0">
+            <a:schemeClr val="accent1"/>
+          </a:effectRef>
+          <a:fontRef idx="minor">
+            <a:schemeClr val="tx1"/>
+          </a:fontRef>
+        </p:style>
+      </p:cxnSp>
+      <p:cxnSp>
+        <p:nvCxnSpPr>
+          <p:cNvPr id="93" name="Straight Arrow Connector 92">
+            <a:extLst>
+              <a:ext uri="{FF2B5EF4-FFF2-40B4-BE49-F238E27FC236}">
+                <a16:creationId xmlns:a16="http://schemas.microsoft.com/office/drawing/2014/main" id="{555F1868-A189-7BA2-B959-6A447B0FB33B}"/>
+              </a:ext>
+            </a:extLst>
+          </p:cNvPr>
+          <p:cNvCxnSpPr>
+            <a:cxnSpLocks/>
+            <a:stCxn id="130" idx="2"/>
+            <a:endCxn id="54" idx="0"/>
+          </p:cNvCxnSpPr>
+          <p:nvPr/>
+        </p:nvCxnSpPr>
+        <p:spPr>
+          <a:xfrm flipH="1">
+            <a:off x="9962768" y="2205055"/>
+            <a:ext cx="664933" cy="2264303"/>
+          </a:xfrm>
+          <a:prstGeom prst="straightConnector1">
+            <a:avLst/>
+          </a:prstGeom>
+          <a:ln>
+            <a:tailEnd type="triangle"/>
+          </a:ln>
+        </p:spPr>
+        <p:style>
+          <a:lnRef idx="1">
+            <a:schemeClr val="accent1"/>
+          </a:lnRef>
+          <a:fillRef idx="0">
+            <a:schemeClr val="accent1"/>
+          </a:fillRef>
+          <a:effectRef idx="0">
+            <a:schemeClr val="accent1"/>
+          </a:effectRef>
+          <a:fontRef idx="minor">
+            <a:schemeClr val="tx1"/>
+          </a:fontRef>
+        </p:style>
+      </p:cxnSp>
+      <p:cxnSp>
+        <p:nvCxnSpPr>
+          <p:cNvPr id="98" name="Straight Arrow Connector 97">
+            <a:extLst>
+              <a:ext uri="{FF2B5EF4-FFF2-40B4-BE49-F238E27FC236}">
+                <a16:creationId xmlns:a16="http://schemas.microsoft.com/office/drawing/2014/main" id="{2ABEAFEF-8DE8-9280-1A91-1540F7F20E5A}"/>
+              </a:ext>
+            </a:extLst>
+          </p:cNvPr>
+          <p:cNvCxnSpPr>
+            <a:stCxn id="48" idx="1"/>
+            <a:endCxn id="19" idx="3"/>
+          </p:cNvCxnSpPr>
+          <p:nvPr/>
+        </p:nvCxnSpPr>
+        <p:spPr>
+          <a:xfrm flipH="1">
+            <a:off x="1952181" y="1712219"/>
+            <a:ext cx="4776760" cy="1320515"/>
+          </a:xfrm>
+          <a:prstGeom prst="straightConnector1">
+            <a:avLst/>
+          </a:prstGeom>
+          <a:ln>
+            <a:tailEnd type="triangle"/>
+          </a:ln>
+        </p:spPr>
+        <p:style>
+          <a:lnRef idx="1">
+            <a:schemeClr val="accent1"/>
+          </a:lnRef>
+          <a:fillRef idx="0">
+            <a:schemeClr val="accent1"/>
+          </a:fillRef>
+          <a:effectRef idx="0">
+            <a:schemeClr val="accent1"/>
+          </a:effectRef>
+          <a:fontRef idx="minor">
+            <a:schemeClr val="tx1"/>
+          </a:fontRef>
+        </p:style>
+      </p:cxnSp>
+      <p:cxnSp>
+        <p:nvCxnSpPr>
+          <p:cNvPr id="104" name="Straight Arrow Connector 103">
+            <a:extLst>
+              <a:ext uri="{FF2B5EF4-FFF2-40B4-BE49-F238E27FC236}">
+                <a16:creationId xmlns:a16="http://schemas.microsoft.com/office/drawing/2014/main" id="{B001DAAE-E34C-DB38-75AB-DD3750F5882D}"/>
+              </a:ext>
+            </a:extLst>
+          </p:cNvPr>
+          <p:cNvCxnSpPr>
+            <a:stCxn id="48" idx="2"/>
+            <a:endCxn id="8" idx="0"/>
+          </p:cNvCxnSpPr>
+          <p:nvPr/>
+        </p:nvCxnSpPr>
+        <p:spPr>
+          <a:xfrm flipH="1">
+            <a:off x="6573176" y="1896885"/>
+            <a:ext cx="667893" cy="1505181"/>
+          </a:xfrm>
+          <a:prstGeom prst="straightConnector1">
+            <a:avLst/>
+          </a:prstGeom>
+          <a:ln>
+            <a:tailEnd type="triangle"/>
+          </a:ln>
+        </p:spPr>
+        <p:style>
+          <a:lnRef idx="1">
+            <a:schemeClr val="accent1"/>
+          </a:lnRef>
+          <a:fillRef idx="0">
+            <a:schemeClr val="accent1"/>
+          </a:fillRef>
+          <a:effectRef idx="0">
+            <a:schemeClr val="accent1"/>
+          </a:effectRef>
+          <a:fontRef idx="minor">
+            <a:schemeClr val="tx1"/>
+          </a:fontRef>
+        </p:style>
+      </p:cxnSp>
+      <p:cxnSp>
+        <p:nvCxnSpPr>
+          <p:cNvPr id="106" name="Straight Arrow Connector 105">
+            <a:extLst>
+              <a:ext uri="{FF2B5EF4-FFF2-40B4-BE49-F238E27FC236}">
+                <a16:creationId xmlns:a16="http://schemas.microsoft.com/office/drawing/2014/main" id="{D32349D3-673F-76BC-44D3-948CB27DC906}"/>
+              </a:ext>
+            </a:extLst>
+          </p:cNvPr>
+          <p:cNvCxnSpPr>
+            <a:stCxn id="48" idx="2"/>
+            <a:endCxn id="11" idx="0"/>
+          </p:cNvCxnSpPr>
+          <p:nvPr/>
+        </p:nvCxnSpPr>
+        <p:spPr>
+          <a:xfrm>
+            <a:off x="7241069" y="1896885"/>
+            <a:ext cx="103059" cy="2140799"/>
+          </a:xfrm>
+          <a:prstGeom prst="straightConnector1">
+            <a:avLst/>
+          </a:prstGeom>
+          <a:ln>
+            <a:tailEnd type="triangle"/>
+          </a:ln>
+        </p:spPr>
+        <p:style>
+          <a:lnRef idx="1">
+            <a:schemeClr val="accent1"/>
+          </a:lnRef>
+          <a:fillRef idx="0">
+            <a:schemeClr val="accent1"/>
+          </a:fillRef>
+          <a:effectRef idx="0">
+            <a:schemeClr val="accent1"/>
+          </a:effectRef>
+          <a:fontRef idx="minor">
+            <a:schemeClr val="tx1"/>
+          </a:fontRef>
+        </p:style>
+      </p:cxnSp>
+      <p:cxnSp>
+        <p:nvCxnSpPr>
+          <p:cNvPr id="108" name="Straight Arrow Connector 107">
+            <a:extLst>
+              <a:ext uri="{FF2B5EF4-FFF2-40B4-BE49-F238E27FC236}">
+                <a16:creationId xmlns:a16="http://schemas.microsoft.com/office/drawing/2014/main" id="{232392D7-03E3-EC2B-9FB4-7205A00F668A}"/>
+              </a:ext>
+            </a:extLst>
+          </p:cNvPr>
+          <p:cNvCxnSpPr>
+            <a:stCxn id="48" idx="2"/>
+            <a:endCxn id="9" idx="0"/>
+          </p:cNvCxnSpPr>
+          <p:nvPr/>
+        </p:nvCxnSpPr>
+        <p:spPr>
+          <a:xfrm flipH="1">
+            <a:off x="6798109" y="1896885"/>
+            <a:ext cx="442960" cy="603540"/>
+          </a:xfrm>
+          <a:prstGeom prst="straightConnector1">
+            <a:avLst/>
+          </a:prstGeom>
+          <a:ln>
+            <a:tailEnd type="triangle"/>
+          </a:ln>
+        </p:spPr>
+        <p:style>
+          <a:lnRef idx="1">
+            <a:schemeClr val="accent1"/>
+          </a:lnRef>
+          <a:fillRef idx="0">
+            <a:schemeClr val="accent1"/>
+          </a:fillRef>
+          <a:effectRef idx="0">
+            <a:schemeClr val="accent1"/>
+          </a:effectRef>
+          <a:fontRef idx="minor">
+            <a:schemeClr val="tx1"/>
+          </a:fontRef>
+        </p:style>
+      </p:cxnSp>
+      <p:sp>
+        <p:nvSpPr>
+          <p:cNvPr id="112" name="TextBox 111">
+            <a:extLst>
+              <a:ext uri="{FF2B5EF4-FFF2-40B4-BE49-F238E27FC236}">
+                <a16:creationId xmlns:a16="http://schemas.microsoft.com/office/drawing/2014/main" id="{C4E5815D-473D-2381-6C89-B428427B0A42}"/>
+              </a:ext>
+            </a:extLst>
+          </p:cNvPr>
+          <p:cNvSpPr txBox="1"/>
+          <p:nvPr/>
+        </p:nvSpPr>
+        <p:spPr>
+          <a:xfrm>
+            <a:off x="414366" y="4407016"/>
+            <a:ext cx="1425070" cy="369332"/>
+          </a:xfrm>
+          <a:prstGeom prst="rect">
+            <a:avLst/>
+          </a:prstGeom>
+          <a:solidFill>
+            <a:schemeClr val="accent4">
+              <a:lumMod val="20000"/>
+              <a:lumOff val="80000"/>
+            </a:schemeClr>
+          </a:solidFill>
+          <a:ln w="28575">
+            <a:solidFill>
+              <a:srgbClr val="00B050"/>
+            </a:solidFill>
+          </a:ln>
+        </p:spPr>
+        <p:txBody>
+          <a:bodyPr wrap="none" rtlCol="0">
+            <a:spAutoFit/>
+          </a:bodyPr>
+          <a:lstStyle/>
+          <a:p>
+            <a:r>
+              <a:rPr lang="en-US" dirty="0"/>
+              <a:t>Image Export</a:t>
+            </a:r>
+            <a:endParaRPr lang="en-CA" dirty="0"/>
+          </a:p>
+        </p:txBody>
+      </p:sp>
+      <p:cxnSp>
+        <p:nvCxnSpPr>
+          <p:cNvPr id="115" name="Straight Arrow Connector 114">
+            <a:extLst>
+              <a:ext uri="{FF2B5EF4-FFF2-40B4-BE49-F238E27FC236}">
+                <a16:creationId xmlns:a16="http://schemas.microsoft.com/office/drawing/2014/main" id="{C6AF6CA9-8D33-B993-9654-239F55E7274B}"/>
+              </a:ext>
+            </a:extLst>
+          </p:cNvPr>
+          <p:cNvCxnSpPr>
+            <a:stCxn id="10" idx="2"/>
+            <a:endCxn id="112" idx="0"/>
+          </p:cNvCxnSpPr>
+          <p:nvPr/>
+        </p:nvCxnSpPr>
+        <p:spPr>
+          <a:xfrm flipH="1">
+            <a:off x="1126901" y="3617014"/>
+            <a:ext cx="2926454" cy="790002"/>
+          </a:xfrm>
+          <a:prstGeom prst="straightConnector1">
+            <a:avLst/>
+          </a:prstGeom>
+          <a:ln>
+            <a:tailEnd type="triangle"/>
+          </a:ln>
+        </p:spPr>
+        <p:style>
+          <a:lnRef idx="1">
+            <a:schemeClr val="accent1"/>
+          </a:lnRef>
+          <a:fillRef idx="0">
+            <a:schemeClr val="accent1"/>
+          </a:fillRef>
+          <a:effectRef idx="0">
+            <a:schemeClr val="accent1"/>
+          </a:effectRef>
+          <a:fontRef idx="minor">
+            <a:schemeClr val="tx1"/>
+          </a:fontRef>
+        </p:style>
+      </p:cxnSp>
+      <p:sp>
+        <p:nvSpPr>
+          <p:cNvPr id="130" name="TextBox 129">
+            <a:extLst>
+              <a:ext uri="{FF2B5EF4-FFF2-40B4-BE49-F238E27FC236}">
+                <a16:creationId xmlns:a16="http://schemas.microsoft.com/office/drawing/2014/main" id="{D597C71D-DD1E-2EFA-FC92-F3E0D2BBC70A}"/>
+              </a:ext>
+            </a:extLst>
+          </p:cNvPr>
+          <p:cNvSpPr txBox="1"/>
+          <p:nvPr/>
+        </p:nvSpPr>
+        <p:spPr>
+          <a:xfrm>
+            <a:off x="9685135" y="1835723"/>
+            <a:ext cx="1885131" cy="369332"/>
           </a:xfrm>
           <a:prstGeom prst="rect">
             <a:avLst/>
@@ -4508,18 +4992,137 @@
           <a:p>
             <a:r>
               <a:rPr lang="en-US" dirty="0"/>
-              <a:t>[Viz] Spot Layout</a:t>
+              <a:t>[Viz] Spot Content</a:t>
             </a:r>
             <a:endParaRPr lang="en-CA" dirty="0"/>
           </a:p>
         </p:txBody>
       </p:sp>
-      <p:sp>
-        <p:nvSpPr>
-          <p:cNvPr id="9" name="TextBox 8">
-            <a:extLst>
-              <a:ext uri="{FF2B5EF4-FFF2-40B4-BE49-F238E27FC236}">
-                <a16:creationId xmlns:a16="http://schemas.microsoft.com/office/drawing/2014/main" id="{4B8279EF-7B21-5C89-BF51-48F60DF1C8E8}"/>
+      <p:cxnSp>
+        <p:nvCxnSpPr>
+          <p:cNvPr id="141" name="Straight Arrow Connector 140">
+            <a:extLst>
+              <a:ext uri="{FF2B5EF4-FFF2-40B4-BE49-F238E27FC236}">
+                <a16:creationId xmlns:a16="http://schemas.microsoft.com/office/drawing/2014/main" id="{D7A56974-CC86-D170-7DF3-E95D68CADC4B}"/>
+              </a:ext>
+            </a:extLst>
+          </p:cNvPr>
+          <p:cNvCxnSpPr>
+            <a:stCxn id="7" idx="2"/>
+            <a:endCxn id="130" idx="0"/>
+          </p:cNvCxnSpPr>
+          <p:nvPr/>
+        </p:nvCxnSpPr>
+        <p:spPr>
+          <a:xfrm>
+            <a:off x="10100861" y="1332498"/>
+            <a:ext cx="526840" cy="503225"/>
+          </a:xfrm>
+          <a:prstGeom prst="straightConnector1">
+            <a:avLst/>
+          </a:prstGeom>
+          <a:ln>
+            <a:tailEnd type="triangle"/>
+          </a:ln>
+        </p:spPr>
+        <p:style>
+          <a:lnRef idx="1">
+            <a:schemeClr val="accent1"/>
+          </a:lnRef>
+          <a:fillRef idx="0">
+            <a:schemeClr val="accent1"/>
+          </a:fillRef>
+          <a:effectRef idx="0">
+            <a:schemeClr val="accent1"/>
+          </a:effectRef>
+          <a:fontRef idx="minor">
+            <a:schemeClr val="tx1"/>
+          </a:fontRef>
+        </p:style>
+      </p:cxnSp>
+      <p:cxnSp>
+        <p:nvCxnSpPr>
+          <p:cNvPr id="143" name="Straight Arrow Connector 142">
+            <a:extLst>
+              <a:ext uri="{FF2B5EF4-FFF2-40B4-BE49-F238E27FC236}">
+                <a16:creationId xmlns:a16="http://schemas.microsoft.com/office/drawing/2014/main" id="{0E5E32D6-EFE2-CED1-F9B8-2C7BEB426D16}"/>
+              </a:ext>
+            </a:extLst>
+          </p:cNvPr>
+          <p:cNvCxnSpPr>
+            <a:stCxn id="130" idx="1"/>
+            <a:endCxn id="48" idx="3"/>
+          </p:cNvCxnSpPr>
+          <p:nvPr/>
+        </p:nvCxnSpPr>
+        <p:spPr>
+          <a:xfrm flipH="1" flipV="1">
+            <a:off x="7753196" y="1712219"/>
+            <a:ext cx="1931939" cy="308170"/>
+          </a:xfrm>
+          <a:prstGeom prst="straightConnector1">
+            <a:avLst/>
+          </a:prstGeom>
+          <a:ln>
+            <a:tailEnd type="triangle"/>
+          </a:ln>
+        </p:spPr>
+        <p:style>
+          <a:lnRef idx="1">
+            <a:schemeClr val="accent1"/>
+          </a:lnRef>
+          <a:fillRef idx="0">
+            <a:schemeClr val="accent1"/>
+          </a:fillRef>
+          <a:effectRef idx="0">
+            <a:schemeClr val="accent1"/>
+          </a:effectRef>
+          <a:fontRef idx="minor">
+            <a:schemeClr val="tx1"/>
+          </a:fontRef>
+        </p:style>
+      </p:cxnSp>
+      <p:pic>
+        <p:nvPicPr>
+          <p:cNvPr id="156" name="Picture 155">
+            <a:extLst>
+              <a:ext uri="{FF2B5EF4-FFF2-40B4-BE49-F238E27FC236}">
+                <a16:creationId xmlns:a16="http://schemas.microsoft.com/office/drawing/2014/main" id="{E78816C2-6CB8-AC89-9A53-2930635D385A}"/>
+              </a:ext>
+            </a:extLst>
+          </p:cNvPr>
+          <p:cNvPicPr>
+            <a:picLocks noChangeAspect="1"/>
+          </p:cNvPicPr>
+          <p:nvPr/>
+        </p:nvPicPr>
+        <p:blipFill rotWithShape="1">
+          <a:blip r:embed="rId2"/>
+          <a:srcRect t="7462" r="4717" b="4142"/>
+          <a:stretch/>
+        </p:blipFill>
+        <p:spPr>
+          <a:xfrm>
+            <a:off x="188851" y="5597291"/>
+            <a:ext cx="4407434" cy="1111565"/>
+          </a:xfrm>
+          <a:prstGeom prst="rect">
+            <a:avLst/>
+          </a:prstGeom>
+          <a:ln w="28575">
+            <a:solidFill>
+              <a:srgbClr val="FFC000"/>
+            </a:solidFill>
+            <a:prstDash val="dash"/>
+          </a:ln>
+        </p:spPr>
+      </p:pic>
+      <p:sp>
+        <p:nvSpPr>
+          <p:cNvPr id="11" name="TextBox 10">
+            <a:extLst>
+              <a:ext uri="{FF2B5EF4-FFF2-40B4-BE49-F238E27FC236}">
+                <a16:creationId xmlns:a16="http://schemas.microsoft.com/office/drawing/2014/main" id="{F59DABB9-C2DC-93CB-5EDD-1FFB68697649}"/>
               </a:ext>
             </a:extLst>
           </p:cNvPr>
@@ -4528,8 +5131,8 @@
         </p:nvSpPr>
         <p:spPr>
           <a:xfrm>
-            <a:off x="6923877" y="3384793"/>
-            <a:ext cx="2209707" cy="369332"/>
+            <a:off x="6110360" y="4037684"/>
+            <a:ext cx="2467535" cy="369332"/>
           </a:xfrm>
           <a:prstGeom prst="rect">
             <a:avLst/>
@@ -4554,11 +5157,7 @@
           <a:p>
             <a:r>
               <a:rPr lang="en-US" dirty="0"/>
-              <a:t>[Viz] Result </a:t>
-            </a:r>
-            <a:r>
-              <a:rPr lang="en-US" dirty="0" err="1"/>
-              <a:t>SubImage</a:t>
+              <a:t>[Viz] Sampled Subregion</a:t>
             </a:r>
             <a:endParaRPr lang="en-CA" dirty="0"/>
           </a:p>
@@ -4566,10 +5165,10 @@
       </p:sp>
       <p:sp>
         <p:nvSpPr>
-          <p:cNvPr id="77" name="TextBox 76">
-            <a:extLst>
-              <a:ext uri="{FF2B5EF4-FFF2-40B4-BE49-F238E27FC236}">
-                <a16:creationId xmlns:a16="http://schemas.microsoft.com/office/drawing/2014/main" id="{487E3CD6-2F17-6D6E-EAED-0985948EDFCD}"/>
+          <p:cNvPr id="54" name="TextBox 53">
+            <a:extLst>
+              <a:ext uri="{FF2B5EF4-FFF2-40B4-BE49-F238E27FC236}">
+                <a16:creationId xmlns:a16="http://schemas.microsoft.com/office/drawing/2014/main" id="{BE29B00D-E8DD-ABA2-DFF4-4C678BC8157C}"/>
               </a:ext>
             </a:extLst>
           </p:cNvPr>
@@ -4578,492 +5177,8 @@
         </p:nvSpPr>
         <p:spPr>
           <a:xfrm>
-            <a:off x="5615734" y="126378"/>
-            <a:ext cx="1837362" cy="369332"/>
-          </a:xfrm>
-          <a:prstGeom prst="rect">
-            <a:avLst/>
-          </a:prstGeom>
-          <a:solidFill>
-            <a:schemeClr val="tx1"/>
-          </a:solidFill>
-          <a:ln w="28575">
-            <a:solidFill>
-              <a:srgbClr val="00B0F0"/>
-            </a:solidFill>
-          </a:ln>
-        </p:spPr>
-        <p:txBody>
-          <a:bodyPr wrap="none" rtlCol="0">
-            <a:spAutoFit/>
-          </a:bodyPr>
-          <a:lstStyle/>
-          <a:p>
-            <a:r>
-              <a:rPr lang="en-US" dirty="0">
-                <a:solidFill>
-                  <a:schemeClr val="bg1"/>
-                </a:solidFill>
-              </a:rPr>
-              <a:t>[App] </a:t>
-            </a:r>
-            <a:r>
-              <a:rPr lang="en-US" dirty="0" err="1">
-                <a:solidFill>
-                  <a:schemeClr val="bg1"/>
-                </a:solidFill>
-              </a:rPr>
-              <a:t>ImgBeamer</a:t>
-            </a:r>
-            <a:endParaRPr lang="en-CA" dirty="0">
-              <a:solidFill>
-                <a:schemeClr val="bg1"/>
-              </a:solidFill>
-            </a:endParaRPr>
-          </a:p>
-        </p:txBody>
-      </p:sp>
-      <p:cxnSp>
-        <p:nvCxnSpPr>
-          <p:cNvPr id="79" name="Straight Arrow Connector 78">
-            <a:extLst>
-              <a:ext uri="{FF2B5EF4-FFF2-40B4-BE49-F238E27FC236}">
-                <a16:creationId xmlns:a16="http://schemas.microsoft.com/office/drawing/2014/main" id="{33E8FCE5-64E2-1004-74D7-9FD94CBC8C01}"/>
-              </a:ext>
-            </a:extLst>
-          </p:cNvPr>
-          <p:cNvCxnSpPr>
-            <a:stCxn id="77" idx="2"/>
-            <a:endCxn id="5" idx="0"/>
-          </p:cNvCxnSpPr>
-          <p:nvPr/>
-        </p:nvCxnSpPr>
-        <p:spPr>
-          <a:xfrm flipH="1">
-            <a:off x="3050047" y="495710"/>
-            <a:ext cx="3484368" cy="481752"/>
-          </a:xfrm>
-          <a:prstGeom prst="straightConnector1">
-            <a:avLst/>
-          </a:prstGeom>
-          <a:ln>
-            <a:tailEnd type="triangle"/>
-          </a:ln>
-        </p:spPr>
-        <p:style>
-          <a:lnRef idx="1">
-            <a:schemeClr val="accent1"/>
-          </a:lnRef>
-          <a:fillRef idx="0">
-            <a:schemeClr val="accent1"/>
-          </a:fillRef>
-          <a:effectRef idx="0">
-            <a:schemeClr val="accent1"/>
-          </a:effectRef>
-          <a:fontRef idx="minor">
-            <a:schemeClr val="tx1"/>
-          </a:fontRef>
-        </p:style>
-      </p:cxnSp>
-      <p:cxnSp>
-        <p:nvCxnSpPr>
-          <p:cNvPr id="81" name="Straight Arrow Connector 80">
-            <a:extLst>
-              <a:ext uri="{FF2B5EF4-FFF2-40B4-BE49-F238E27FC236}">
-                <a16:creationId xmlns:a16="http://schemas.microsoft.com/office/drawing/2014/main" id="{35D1A7D3-92DE-A190-BDD2-AF306FA3FF0A}"/>
-              </a:ext>
-            </a:extLst>
-          </p:cNvPr>
-          <p:cNvCxnSpPr>
-            <a:stCxn id="77" idx="2"/>
-            <a:endCxn id="6" idx="0"/>
-          </p:cNvCxnSpPr>
-          <p:nvPr/>
-        </p:nvCxnSpPr>
-        <p:spPr>
-          <a:xfrm flipH="1">
-            <a:off x="5256946" y="495710"/>
-            <a:ext cx="1277469" cy="467456"/>
-          </a:xfrm>
-          <a:prstGeom prst="straightConnector1">
-            <a:avLst/>
-          </a:prstGeom>
-          <a:ln>
-            <a:tailEnd type="triangle"/>
-          </a:ln>
-        </p:spPr>
-        <p:style>
-          <a:lnRef idx="1">
-            <a:schemeClr val="accent1"/>
-          </a:lnRef>
-          <a:fillRef idx="0">
-            <a:schemeClr val="accent1"/>
-          </a:fillRef>
-          <a:effectRef idx="0">
-            <a:schemeClr val="accent1"/>
-          </a:effectRef>
-          <a:fontRef idx="minor">
-            <a:schemeClr val="tx1"/>
-          </a:fontRef>
-        </p:style>
-      </p:cxnSp>
-      <p:cxnSp>
-        <p:nvCxnSpPr>
-          <p:cNvPr id="83" name="Straight Arrow Connector 82">
-            <a:extLst>
-              <a:ext uri="{FF2B5EF4-FFF2-40B4-BE49-F238E27FC236}">
-                <a16:creationId xmlns:a16="http://schemas.microsoft.com/office/drawing/2014/main" id="{3B463BD6-F041-2DBF-96F6-6C2D94FB8D52}"/>
-              </a:ext>
-            </a:extLst>
-          </p:cNvPr>
-          <p:cNvCxnSpPr>
-            <a:stCxn id="77" idx="2"/>
-            <a:endCxn id="7" idx="0"/>
-          </p:cNvCxnSpPr>
-          <p:nvPr/>
-        </p:nvCxnSpPr>
-        <p:spPr>
-          <a:xfrm>
-            <a:off x="6534415" y="495710"/>
-            <a:ext cx="3566446" cy="467456"/>
-          </a:xfrm>
-          <a:prstGeom prst="straightConnector1">
-            <a:avLst/>
-          </a:prstGeom>
-          <a:ln>
-            <a:tailEnd type="triangle"/>
-          </a:ln>
-        </p:spPr>
-        <p:style>
-          <a:lnRef idx="1">
-            <a:schemeClr val="accent1"/>
-          </a:lnRef>
-          <a:fillRef idx="0">
-            <a:schemeClr val="accent1"/>
-          </a:fillRef>
-          <a:effectRef idx="0">
-            <a:schemeClr val="accent1"/>
-          </a:effectRef>
-          <a:fontRef idx="minor">
-            <a:schemeClr val="tx1"/>
-          </a:fontRef>
-        </p:style>
-      </p:cxnSp>
-      <p:cxnSp>
-        <p:nvCxnSpPr>
-          <p:cNvPr id="93" name="Straight Arrow Connector 92">
-            <a:extLst>
-              <a:ext uri="{FF2B5EF4-FFF2-40B4-BE49-F238E27FC236}">
-                <a16:creationId xmlns:a16="http://schemas.microsoft.com/office/drawing/2014/main" id="{555F1868-A189-7BA2-B959-6A447B0FB33B}"/>
-              </a:ext>
-            </a:extLst>
-          </p:cNvPr>
-          <p:cNvCxnSpPr>
-            <a:cxnSpLocks/>
-            <a:stCxn id="130" idx="2"/>
-            <a:endCxn id="54" idx="0"/>
-          </p:cNvCxnSpPr>
-          <p:nvPr/>
-        </p:nvCxnSpPr>
-        <p:spPr>
-          <a:xfrm flipH="1">
-            <a:off x="9864052" y="2205055"/>
-            <a:ext cx="763649" cy="2445051"/>
-          </a:xfrm>
-          <a:prstGeom prst="straightConnector1">
-            <a:avLst/>
-          </a:prstGeom>
-          <a:ln>
-            <a:tailEnd type="triangle"/>
-          </a:ln>
-        </p:spPr>
-        <p:style>
-          <a:lnRef idx="1">
-            <a:schemeClr val="accent1"/>
-          </a:lnRef>
-          <a:fillRef idx="0">
-            <a:schemeClr val="accent1"/>
-          </a:fillRef>
-          <a:effectRef idx="0">
-            <a:schemeClr val="accent1"/>
-          </a:effectRef>
-          <a:fontRef idx="minor">
-            <a:schemeClr val="tx1"/>
-          </a:fontRef>
-        </p:style>
-      </p:cxnSp>
-      <p:cxnSp>
-        <p:nvCxnSpPr>
-          <p:cNvPr id="98" name="Straight Arrow Connector 97">
-            <a:extLst>
-              <a:ext uri="{FF2B5EF4-FFF2-40B4-BE49-F238E27FC236}">
-                <a16:creationId xmlns:a16="http://schemas.microsoft.com/office/drawing/2014/main" id="{2ABEAFEF-8DE8-9280-1A91-1540F7F20E5A}"/>
-              </a:ext>
-            </a:extLst>
-          </p:cNvPr>
-          <p:cNvCxnSpPr>
-            <a:stCxn id="48" idx="1"/>
-            <a:endCxn id="19" idx="3"/>
-          </p:cNvCxnSpPr>
-          <p:nvPr/>
-        </p:nvCxnSpPr>
-        <p:spPr>
-          <a:xfrm flipH="1">
-            <a:off x="1952181" y="1627652"/>
-            <a:ext cx="4791902" cy="1405082"/>
-          </a:xfrm>
-          <a:prstGeom prst="straightConnector1">
-            <a:avLst/>
-          </a:prstGeom>
-          <a:ln>
-            <a:tailEnd type="triangle"/>
-          </a:ln>
-        </p:spPr>
-        <p:style>
-          <a:lnRef idx="1">
-            <a:schemeClr val="accent1"/>
-          </a:lnRef>
-          <a:fillRef idx="0">
-            <a:schemeClr val="accent1"/>
-          </a:fillRef>
-          <a:effectRef idx="0">
-            <a:schemeClr val="accent1"/>
-          </a:effectRef>
-          <a:fontRef idx="minor">
-            <a:schemeClr val="tx1"/>
-          </a:fontRef>
-        </p:style>
-      </p:cxnSp>
-      <p:cxnSp>
-        <p:nvCxnSpPr>
-          <p:cNvPr id="104" name="Straight Arrow Connector 103">
-            <a:extLst>
-              <a:ext uri="{FF2B5EF4-FFF2-40B4-BE49-F238E27FC236}">
-                <a16:creationId xmlns:a16="http://schemas.microsoft.com/office/drawing/2014/main" id="{B001DAAE-E34C-DB38-75AB-DD3750F5882D}"/>
-              </a:ext>
-            </a:extLst>
-          </p:cNvPr>
-          <p:cNvCxnSpPr>
-            <a:stCxn id="48" idx="2"/>
-            <a:endCxn id="8" idx="0"/>
-          </p:cNvCxnSpPr>
-          <p:nvPr/>
-        </p:nvCxnSpPr>
-        <p:spPr>
-          <a:xfrm flipH="1">
-            <a:off x="2364529" y="1812318"/>
-            <a:ext cx="4891682" cy="2653122"/>
-          </a:xfrm>
-          <a:prstGeom prst="straightConnector1">
-            <a:avLst/>
-          </a:prstGeom>
-          <a:ln>
-            <a:tailEnd type="triangle"/>
-          </a:ln>
-        </p:spPr>
-        <p:style>
-          <a:lnRef idx="1">
-            <a:schemeClr val="accent1"/>
-          </a:lnRef>
-          <a:fillRef idx="0">
-            <a:schemeClr val="accent1"/>
-          </a:fillRef>
-          <a:effectRef idx="0">
-            <a:schemeClr val="accent1"/>
-          </a:effectRef>
-          <a:fontRef idx="minor">
-            <a:schemeClr val="tx1"/>
-          </a:fontRef>
-        </p:style>
-      </p:cxnSp>
-      <p:cxnSp>
-        <p:nvCxnSpPr>
-          <p:cNvPr id="106" name="Straight Arrow Connector 105">
-            <a:extLst>
-              <a:ext uri="{FF2B5EF4-FFF2-40B4-BE49-F238E27FC236}">
-                <a16:creationId xmlns:a16="http://schemas.microsoft.com/office/drawing/2014/main" id="{D32349D3-673F-76BC-44D3-948CB27DC906}"/>
-              </a:ext>
-            </a:extLst>
-          </p:cNvPr>
-          <p:cNvCxnSpPr>
-            <a:stCxn id="48" idx="2"/>
-            <a:endCxn id="11" idx="0"/>
-          </p:cNvCxnSpPr>
-          <p:nvPr/>
-        </p:nvCxnSpPr>
-        <p:spPr>
-          <a:xfrm flipH="1">
-            <a:off x="5490366" y="1812318"/>
-            <a:ext cx="1765845" cy="1893873"/>
-          </a:xfrm>
-          <a:prstGeom prst="straightConnector1">
-            <a:avLst/>
-          </a:prstGeom>
-          <a:ln>
-            <a:tailEnd type="triangle"/>
-          </a:ln>
-        </p:spPr>
-        <p:style>
-          <a:lnRef idx="1">
-            <a:schemeClr val="accent1"/>
-          </a:lnRef>
-          <a:fillRef idx="0">
-            <a:schemeClr val="accent1"/>
-          </a:fillRef>
-          <a:effectRef idx="0">
-            <a:schemeClr val="accent1"/>
-          </a:effectRef>
-          <a:fontRef idx="minor">
-            <a:schemeClr val="tx1"/>
-          </a:fontRef>
-        </p:style>
-      </p:cxnSp>
-      <p:cxnSp>
-        <p:nvCxnSpPr>
-          <p:cNvPr id="108" name="Straight Arrow Connector 107">
-            <a:extLst>
-              <a:ext uri="{FF2B5EF4-FFF2-40B4-BE49-F238E27FC236}">
-                <a16:creationId xmlns:a16="http://schemas.microsoft.com/office/drawing/2014/main" id="{232392D7-03E3-EC2B-9FB4-7205A00F668A}"/>
-              </a:ext>
-            </a:extLst>
-          </p:cNvPr>
-          <p:cNvCxnSpPr>
-            <a:stCxn id="48" idx="2"/>
-            <a:endCxn id="9" idx="0"/>
-          </p:cNvCxnSpPr>
-          <p:nvPr/>
-        </p:nvCxnSpPr>
-        <p:spPr>
-          <a:xfrm>
-            <a:off x="7256211" y="1812318"/>
-            <a:ext cx="772520" cy="1572475"/>
-          </a:xfrm>
-          <a:prstGeom prst="straightConnector1">
-            <a:avLst/>
-          </a:prstGeom>
-          <a:ln>
-            <a:tailEnd type="triangle"/>
-          </a:ln>
-        </p:spPr>
-        <p:style>
-          <a:lnRef idx="1">
-            <a:schemeClr val="accent1"/>
-          </a:lnRef>
-          <a:fillRef idx="0">
-            <a:schemeClr val="accent1"/>
-          </a:fillRef>
-          <a:effectRef idx="0">
-            <a:schemeClr val="accent1"/>
-          </a:effectRef>
-          <a:fontRef idx="minor">
-            <a:schemeClr val="tx1"/>
-          </a:fontRef>
-        </p:style>
-      </p:cxnSp>
-      <p:sp>
-        <p:nvSpPr>
-          <p:cNvPr id="112" name="TextBox 111">
-            <a:extLst>
-              <a:ext uri="{FF2B5EF4-FFF2-40B4-BE49-F238E27FC236}">
-                <a16:creationId xmlns:a16="http://schemas.microsoft.com/office/drawing/2014/main" id="{C4E5815D-473D-2381-6C89-B428427B0A42}"/>
-              </a:ext>
-            </a:extLst>
-          </p:cNvPr>
-          <p:cNvSpPr txBox="1"/>
-          <p:nvPr/>
-        </p:nvSpPr>
-        <p:spPr>
-          <a:xfrm>
-            <a:off x="10616328" y="5511206"/>
-            <a:ext cx="1425070" cy="369332"/>
-          </a:xfrm>
-          <a:prstGeom prst="rect">
-            <a:avLst/>
-          </a:prstGeom>
-          <a:solidFill>
-            <a:schemeClr val="accent4">
-              <a:lumMod val="20000"/>
-              <a:lumOff val="80000"/>
-            </a:schemeClr>
-          </a:solidFill>
-          <a:ln w="28575">
-            <a:solidFill>
-              <a:srgbClr val="00B050"/>
-            </a:solidFill>
-          </a:ln>
-        </p:spPr>
-        <p:txBody>
-          <a:bodyPr wrap="none" rtlCol="0">
-            <a:spAutoFit/>
-          </a:bodyPr>
-          <a:lstStyle/>
-          <a:p>
-            <a:r>
-              <a:rPr lang="en-US" dirty="0"/>
-              <a:t>Image Export</a:t>
-            </a:r>
-            <a:endParaRPr lang="en-CA" dirty="0"/>
-          </a:p>
-        </p:txBody>
-      </p:sp>
-      <p:cxnSp>
-        <p:nvCxnSpPr>
-          <p:cNvPr id="115" name="Straight Arrow Connector 114">
-            <a:extLst>
-              <a:ext uri="{FF2B5EF4-FFF2-40B4-BE49-F238E27FC236}">
-                <a16:creationId xmlns:a16="http://schemas.microsoft.com/office/drawing/2014/main" id="{C6AF6CA9-8D33-B993-9654-239F55E7274B}"/>
-              </a:ext>
-            </a:extLst>
-          </p:cNvPr>
-          <p:cNvCxnSpPr>
-            <a:stCxn id="10" idx="2"/>
-            <a:endCxn id="112" idx="0"/>
-          </p:cNvCxnSpPr>
-          <p:nvPr/>
-        </p:nvCxnSpPr>
-        <p:spPr>
-          <a:xfrm>
-            <a:off x="10973617" y="3970116"/>
-            <a:ext cx="355246" cy="1541090"/>
-          </a:xfrm>
-          <a:prstGeom prst="straightConnector1">
-            <a:avLst/>
-          </a:prstGeom>
-          <a:ln>
-            <a:tailEnd type="triangle"/>
-          </a:ln>
-        </p:spPr>
-        <p:style>
-          <a:lnRef idx="1">
-            <a:schemeClr val="accent1"/>
-          </a:lnRef>
-          <a:fillRef idx="0">
-            <a:schemeClr val="accent1"/>
-          </a:fillRef>
-          <a:effectRef idx="0">
-            <a:schemeClr val="accent1"/>
-          </a:effectRef>
-          <a:fontRef idx="minor">
-            <a:schemeClr val="tx1"/>
-          </a:fontRef>
-        </p:style>
-      </p:cxnSp>
-      <p:sp>
-        <p:nvSpPr>
-          <p:cNvPr id="130" name="TextBox 129">
-            <a:extLst>
-              <a:ext uri="{FF2B5EF4-FFF2-40B4-BE49-F238E27FC236}">
-                <a16:creationId xmlns:a16="http://schemas.microsoft.com/office/drawing/2014/main" id="{D597C71D-DD1E-2EFA-FC92-F3E0D2BBC70A}"/>
-              </a:ext>
-            </a:extLst>
-          </p:cNvPr>
-          <p:cNvSpPr txBox="1"/>
-          <p:nvPr/>
-        </p:nvSpPr>
-        <p:spPr>
-          <a:xfrm>
-            <a:off x="9685135" y="1835723"/>
-            <a:ext cx="1885131" cy="369332"/>
+            <a:off x="9119428" y="4469358"/>
+            <a:ext cx="1686680" cy="369332"/>
           </a:xfrm>
           <a:prstGeom prst="rect">
             <a:avLst/>
@@ -5088,7 +5203,114 @@
           <a:p>
             <a:r>
               <a:rPr lang="en-US" dirty="0"/>
-              <a:t>[Viz] Spot Content</a:t>
+              <a:t>[Viz] Spot Signal</a:t>
+            </a:r>
+            <a:endParaRPr lang="en-CA" dirty="0"/>
+          </a:p>
+        </p:txBody>
+      </p:sp>
+      <p:sp>
+        <p:nvSpPr>
+          <p:cNvPr id="44" name="TextBox 43">
+            <a:extLst>
+              <a:ext uri="{FF2B5EF4-FFF2-40B4-BE49-F238E27FC236}">
+                <a16:creationId xmlns:a16="http://schemas.microsoft.com/office/drawing/2014/main" id="{FAA5776C-C1CE-7631-C39C-69F17081254A}"/>
+              </a:ext>
+            </a:extLst>
+          </p:cNvPr>
+          <p:cNvSpPr txBox="1"/>
+          <p:nvPr/>
+        </p:nvSpPr>
+        <p:spPr>
+          <a:xfrm>
+            <a:off x="2426883" y="4377025"/>
+            <a:ext cx="2091535" cy="923330"/>
+          </a:xfrm>
+          <a:prstGeom prst="rect">
+            <a:avLst/>
+          </a:prstGeom>
+          <a:solidFill>
+            <a:schemeClr val="accent5">
+              <a:lumMod val="20000"/>
+              <a:lumOff val="80000"/>
+            </a:schemeClr>
+          </a:solidFill>
+          <a:ln w="28575">
+            <a:solidFill>
+              <a:srgbClr val="7030A0"/>
+            </a:solidFill>
+          </a:ln>
+        </p:spPr>
+        <p:txBody>
+          <a:bodyPr wrap="none" rtlCol="0">
+            <a:spAutoFit/>
+          </a:bodyPr>
+          <a:lstStyle/>
+          <a:p>
+            <a:pPr algn="ctr"/>
+            <a:r>
+              <a:rPr lang="en-US" dirty="0"/>
+              <a:t>Draw Stage / Canvas</a:t>
+            </a:r>
+          </a:p>
+          <a:p>
+            <a:pPr algn="ctr"/>
+            <a:r>
+              <a:rPr lang="en-US" dirty="0"/>
+              <a:t>&amp;</a:t>
+            </a:r>
+          </a:p>
+          <a:p>
+            <a:pPr algn="ctr"/>
+            <a:r>
+              <a:rPr lang="en-US" dirty="0"/>
+              <a:t>Image Manipulation</a:t>
+            </a:r>
+            <a:endParaRPr lang="en-CA" dirty="0"/>
+          </a:p>
+        </p:txBody>
+      </p:sp>
+      <p:sp>
+        <p:nvSpPr>
+          <p:cNvPr id="46" name="TextBox 45">
+            <a:extLst>
+              <a:ext uri="{FF2B5EF4-FFF2-40B4-BE49-F238E27FC236}">
+                <a16:creationId xmlns:a16="http://schemas.microsoft.com/office/drawing/2014/main" id="{31B15FAA-D51C-FA36-52F4-24C446DD1DFF}"/>
+              </a:ext>
+            </a:extLst>
+          </p:cNvPr>
+          <p:cNvSpPr txBox="1"/>
+          <p:nvPr/>
+        </p:nvSpPr>
+        <p:spPr>
+          <a:xfrm>
+            <a:off x="5564294" y="5992958"/>
+            <a:ext cx="1281120" cy="369332"/>
+          </a:xfrm>
+          <a:prstGeom prst="rect">
+            <a:avLst/>
+          </a:prstGeom>
+          <a:solidFill>
+            <a:schemeClr val="accent5">
+              <a:lumMod val="20000"/>
+              <a:lumOff val="80000"/>
+            </a:schemeClr>
+          </a:solidFill>
+          <a:ln w="28575">
+            <a:solidFill>
+              <a:srgbClr val="7030A0"/>
+            </a:solidFill>
+          </a:ln>
+        </p:spPr>
+        <p:txBody>
+          <a:bodyPr wrap="none" rtlCol="0">
+            <a:spAutoFit/>
+          </a:bodyPr>
+          <a:lstStyle/>
+          <a:p>
+            <a:r>
+              <a:rPr lang="en-US" dirty="0"/>
+              <a:t>HTML DOM</a:t>
             </a:r>
             <a:endParaRPr lang="en-CA" dirty="0"/>
           </a:p>
@@ -5096,23 +5318,24 @@
       </p:sp>
       <p:cxnSp>
         <p:nvCxnSpPr>
-          <p:cNvPr id="141" name="Straight Arrow Connector 140">
-            <a:extLst>
-              <a:ext uri="{FF2B5EF4-FFF2-40B4-BE49-F238E27FC236}">
-                <a16:creationId xmlns:a16="http://schemas.microsoft.com/office/drawing/2014/main" id="{D7A56974-CC86-D170-7DF3-E95D68CADC4B}"/>
+          <p:cNvPr id="67" name="Straight Arrow Connector 66">
+            <a:extLst>
+              <a:ext uri="{FF2B5EF4-FFF2-40B4-BE49-F238E27FC236}">
+                <a16:creationId xmlns:a16="http://schemas.microsoft.com/office/drawing/2014/main" id="{5A024EE3-9141-8C6D-DEB6-92560DCFD300}"/>
               </a:ext>
             </a:extLst>
           </p:cNvPr>
           <p:cNvCxnSpPr>
-            <a:stCxn id="7" idx="2"/>
-            <a:endCxn id="130" idx="0"/>
+            <a:cxnSpLocks/>
+            <a:stCxn id="59" idx="2"/>
+            <a:endCxn id="46" idx="0"/>
           </p:cNvCxnSpPr>
           <p:nvPr/>
         </p:nvCxnSpPr>
         <p:spPr>
-          <a:xfrm>
-            <a:off x="10100861" y="1332498"/>
-            <a:ext cx="526840" cy="503225"/>
+          <a:xfrm flipH="1">
+            <a:off x="6204854" y="5434286"/>
+            <a:ext cx="549736" cy="558672"/>
           </a:xfrm>
           <a:prstGeom prst="straightConnector1">
             <a:avLst/>
@@ -5138,23 +5361,23 @@
       </p:cxnSp>
       <p:cxnSp>
         <p:nvCxnSpPr>
-          <p:cNvPr id="143" name="Straight Arrow Connector 142">
-            <a:extLst>
-              <a:ext uri="{FF2B5EF4-FFF2-40B4-BE49-F238E27FC236}">
-                <a16:creationId xmlns:a16="http://schemas.microsoft.com/office/drawing/2014/main" id="{0E5E32D6-EFE2-CED1-F9B8-2C7BEB426D16}"/>
+          <p:cNvPr id="146" name="Straight Arrow Connector 145">
+            <a:extLst>
+              <a:ext uri="{FF2B5EF4-FFF2-40B4-BE49-F238E27FC236}">
+                <a16:creationId xmlns:a16="http://schemas.microsoft.com/office/drawing/2014/main" id="{BEB0F78C-D3D3-5D09-0BB5-11C74F8B0767}"/>
               </a:ext>
             </a:extLst>
           </p:cNvPr>
           <p:cNvCxnSpPr>
-            <a:stCxn id="130" idx="1"/>
-            <a:endCxn id="48" idx="3"/>
+            <a:stCxn id="19" idx="2"/>
+            <a:endCxn id="44" idx="0"/>
           </p:cNvCxnSpPr>
           <p:nvPr/>
         </p:nvCxnSpPr>
         <p:spPr>
-          <a:xfrm flipH="1" flipV="1">
-            <a:off x="7768338" y="1627652"/>
-            <a:ext cx="1916797" cy="392737"/>
+          <a:xfrm>
+            <a:off x="1151225" y="3217400"/>
+            <a:ext cx="2321426" cy="1159625"/>
           </a:xfrm>
           <a:prstGeom prst="straightConnector1">
             <a:avLst/>
@@ -5178,47 +5401,264 @@
           </a:fontRef>
         </p:style>
       </p:cxnSp>
-      <p:pic>
-        <p:nvPicPr>
-          <p:cNvPr id="156" name="Picture 155">
-            <a:extLst>
-              <a:ext uri="{FF2B5EF4-FFF2-40B4-BE49-F238E27FC236}">
-                <a16:creationId xmlns:a16="http://schemas.microsoft.com/office/drawing/2014/main" id="{E78816C2-6CB8-AC89-9A53-2930635D385A}"/>
-              </a:ext>
-            </a:extLst>
-          </p:cNvPr>
-          <p:cNvPicPr>
-            <a:picLocks noChangeAspect="1"/>
-          </p:cNvPicPr>
+      <p:cxnSp>
+        <p:nvCxnSpPr>
+          <p:cNvPr id="149" name="Straight Arrow Connector 148">
+            <a:extLst>
+              <a:ext uri="{FF2B5EF4-FFF2-40B4-BE49-F238E27FC236}">
+                <a16:creationId xmlns:a16="http://schemas.microsoft.com/office/drawing/2014/main" id="{6F9F5E09-C4B8-4CD2-08FA-5DE3A23238F1}"/>
+              </a:ext>
+            </a:extLst>
+          </p:cNvPr>
+          <p:cNvCxnSpPr>
+            <a:stCxn id="10" idx="2"/>
+            <a:endCxn id="44" idx="0"/>
+          </p:cNvCxnSpPr>
           <p:nvPr/>
-        </p:nvPicPr>
-        <p:blipFill rotWithShape="1">
-          <a:blip r:embed="rId2"/>
-          <a:srcRect t="7462" r="4717" b="4142"/>
-          <a:stretch/>
-        </p:blipFill>
-        <p:spPr>
-          <a:xfrm>
-            <a:off x="3412017" y="5525502"/>
-            <a:ext cx="4407434" cy="1111565"/>
-          </a:xfrm>
-          <a:prstGeom prst="rect">
-            <a:avLst/>
-          </a:prstGeom>
-          <a:ln w="28575">
-            <a:solidFill>
-              <a:srgbClr val="FFC000"/>
-            </a:solidFill>
-            <a:prstDash val="dash"/>
+        </p:nvCxnSpPr>
+        <p:spPr>
+          <a:xfrm flipH="1">
+            <a:off x="3472651" y="3617014"/>
+            <a:ext cx="580704" cy="760011"/>
+          </a:xfrm>
+          <a:prstGeom prst="straightConnector1">
+            <a:avLst/>
+          </a:prstGeom>
+          <a:ln>
+            <a:tailEnd type="triangle"/>
           </a:ln>
         </p:spPr>
-      </p:pic>
-      <p:sp>
-        <p:nvSpPr>
-          <p:cNvPr id="11" name="TextBox 10">
-            <a:extLst>
-              <a:ext uri="{FF2B5EF4-FFF2-40B4-BE49-F238E27FC236}">
-                <a16:creationId xmlns:a16="http://schemas.microsoft.com/office/drawing/2014/main" id="{F59DABB9-C2DC-93CB-5EDD-1FFB68697649}"/>
+        <p:style>
+          <a:lnRef idx="1">
+            <a:schemeClr val="accent1"/>
+          </a:lnRef>
+          <a:fillRef idx="0">
+            <a:schemeClr val="accent1"/>
+          </a:fillRef>
+          <a:effectRef idx="0">
+            <a:schemeClr val="accent1"/>
+          </a:effectRef>
+          <a:fontRef idx="minor">
+            <a:schemeClr val="tx1"/>
+          </a:fontRef>
+        </p:style>
+      </p:cxnSp>
+      <p:cxnSp>
+        <p:nvCxnSpPr>
+          <p:cNvPr id="151" name="Straight Arrow Connector 150">
+            <a:extLst>
+              <a:ext uri="{FF2B5EF4-FFF2-40B4-BE49-F238E27FC236}">
+                <a16:creationId xmlns:a16="http://schemas.microsoft.com/office/drawing/2014/main" id="{D9055733-1F63-682E-37B2-ABDD258614A0}"/>
+              </a:ext>
+            </a:extLst>
+          </p:cNvPr>
+          <p:cNvCxnSpPr>
+            <a:stCxn id="9" idx="1"/>
+            <a:endCxn id="44" idx="0"/>
+          </p:cNvCxnSpPr>
+          <p:nvPr/>
+        </p:nvCxnSpPr>
+        <p:spPr>
+          <a:xfrm flipH="1">
+            <a:off x="3472651" y="2685091"/>
+            <a:ext cx="2220604" cy="1691934"/>
+          </a:xfrm>
+          <a:prstGeom prst="straightConnector1">
+            <a:avLst/>
+          </a:prstGeom>
+          <a:ln>
+            <a:tailEnd type="triangle"/>
+          </a:ln>
+        </p:spPr>
+        <p:style>
+          <a:lnRef idx="1">
+            <a:schemeClr val="accent1"/>
+          </a:lnRef>
+          <a:fillRef idx="0">
+            <a:schemeClr val="accent1"/>
+          </a:fillRef>
+          <a:effectRef idx="0">
+            <a:schemeClr val="accent1"/>
+          </a:effectRef>
+          <a:fontRef idx="minor">
+            <a:schemeClr val="tx1"/>
+          </a:fontRef>
+        </p:style>
+      </p:cxnSp>
+      <p:cxnSp>
+        <p:nvCxnSpPr>
+          <p:cNvPr id="153" name="Straight Arrow Connector 152">
+            <a:extLst>
+              <a:ext uri="{FF2B5EF4-FFF2-40B4-BE49-F238E27FC236}">
+                <a16:creationId xmlns:a16="http://schemas.microsoft.com/office/drawing/2014/main" id="{F6E6377C-DC30-EECF-D9E8-C41809F9B0C5}"/>
+              </a:ext>
+            </a:extLst>
+          </p:cNvPr>
+          <p:cNvCxnSpPr>
+            <a:stCxn id="8" idx="1"/>
+            <a:endCxn id="44" idx="0"/>
+          </p:cNvCxnSpPr>
+          <p:nvPr/>
+        </p:nvCxnSpPr>
+        <p:spPr>
+          <a:xfrm flipH="1">
+            <a:off x="3472651" y="3586732"/>
+            <a:ext cx="2220604" cy="790293"/>
+          </a:xfrm>
+          <a:prstGeom prst="straightConnector1">
+            <a:avLst/>
+          </a:prstGeom>
+          <a:ln>
+            <a:tailEnd type="triangle"/>
+          </a:ln>
+        </p:spPr>
+        <p:style>
+          <a:lnRef idx="1">
+            <a:schemeClr val="accent1"/>
+          </a:lnRef>
+          <a:fillRef idx="0">
+            <a:schemeClr val="accent1"/>
+          </a:fillRef>
+          <a:effectRef idx="0">
+            <a:schemeClr val="accent1"/>
+          </a:effectRef>
+          <a:fontRef idx="minor">
+            <a:schemeClr val="tx1"/>
+          </a:fontRef>
+        </p:style>
+      </p:cxnSp>
+      <p:cxnSp>
+        <p:nvCxnSpPr>
+          <p:cNvPr id="155" name="Straight Arrow Connector 154">
+            <a:extLst>
+              <a:ext uri="{FF2B5EF4-FFF2-40B4-BE49-F238E27FC236}">
+                <a16:creationId xmlns:a16="http://schemas.microsoft.com/office/drawing/2014/main" id="{AF6562D4-4DC5-5D66-842C-FDE3E228E266}"/>
+              </a:ext>
+            </a:extLst>
+          </p:cNvPr>
+          <p:cNvCxnSpPr>
+            <a:stCxn id="11" idx="1"/>
+            <a:endCxn id="44" idx="3"/>
+          </p:cNvCxnSpPr>
+          <p:nvPr/>
+        </p:nvCxnSpPr>
+        <p:spPr>
+          <a:xfrm flipH="1">
+            <a:off x="4518418" y="4222350"/>
+            <a:ext cx="1591942" cy="616340"/>
+          </a:xfrm>
+          <a:prstGeom prst="straightConnector1">
+            <a:avLst/>
+          </a:prstGeom>
+          <a:ln>
+            <a:tailEnd type="triangle"/>
+          </a:ln>
+        </p:spPr>
+        <p:style>
+          <a:lnRef idx="1">
+            <a:schemeClr val="accent1"/>
+          </a:lnRef>
+          <a:fillRef idx="0">
+            <a:schemeClr val="accent1"/>
+          </a:fillRef>
+          <a:effectRef idx="0">
+            <a:schemeClr val="accent1"/>
+          </a:effectRef>
+          <a:fontRef idx="minor">
+            <a:schemeClr val="tx1"/>
+          </a:fontRef>
+        </p:style>
+      </p:cxnSp>
+      <p:cxnSp>
+        <p:nvCxnSpPr>
+          <p:cNvPr id="158" name="Straight Arrow Connector 157">
+            <a:extLst>
+              <a:ext uri="{FF2B5EF4-FFF2-40B4-BE49-F238E27FC236}">
+                <a16:creationId xmlns:a16="http://schemas.microsoft.com/office/drawing/2014/main" id="{5E0A433A-5C3E-FBE8-0C18-930B8D2F3567}"/>
+              </a:ext>
+            </a:extLst>
+          </p:cNvPr>
+          <p:cNvCxnSpPr>
+            <a:stCxn id="130" idx="1"/>
+            <a:endCxn id="44" idx="3"/>
+          </p:cNvCxnSpPr>
+          <p:nvPr/>
+        </p:nvCxnSpPr>
+        <p:spPr>
+          <a:xfrm flipH="1">
+            <a:off x="4518418" y="2020389"/>
+            <a:ext cx="5166717" cy="2818301"/>
+          </a:xfrm>
+          <a:prstGeom prst="straightConnector1">
+            <a:avLst/>
+          </a:prstGeom>
+          <a:ln>
+            <a:tailEnd type="triangle"/>
+          </a:ln>
+        </p:spPr>
+        <p:style>
+          <a:lnRef idx="1">
+            <a:schemeClr val="accent1"/>
+          </a:lnRef>
+          <a:fillRef idx="0">
+            <a:schemeClr val="accent1"/>
+          </a:fillRef>
+          <a:effectRef idx="0">
+            <a:schemeClr val="accent1"/>
+          </a:effectRef>
+          <a:fontRef idx="minor">
+            <a:schemeClr val="tx1"/>
+          </a:fontRef>
+        </p:style>
+      </p:cxnSp>
+      <p:cxnSp>
+        <p:nvCxnSpPr>
+          <p:cNvPr id="160" name="Straight Arrow Connector 159">
+            <a:extLst>
+              <a:ext uri="{FF2B5EF4-FFF2-40B4-BE49-F238E27FC236}">
+                <a16:creationId xmlns:a16="http://schemas.microsoft.com/office/drawing/2014/main" id="{1DC45232-70E6-55C8-651F-56F1E178A878}"/>
+              </a:ext>
+            </a:extLst>
+          </p:cNvPr>
+          <p:cNvCxnSpPr>
+            <a:stCxn id="54" idx="1"/>
+            <a:endCxn id="44" idx="3"/>
+          </p:cNvCxnSpPr>
+          <p:nvPr/>
+        </p:nvCxnSpPr>
+        <p:spPr>
+          <a:xfrm flipH="1">
+            <a:off x="4518418" y="4654024"/>
+            <a:ext cx="4601010" cy="184666"/>
+          </a:xfrm>
+          <a:prstGeom prst="straightConnector1">
+            <a:avLst/>
+          </a:prstGeom>
+          <a:ln>
+            <a:tailEnd type="triangle"/>
+          </a:ln>
+        </p:spPr>
+        <p:style>
+          <a:lnRef idx="1">
+            <a:schemeClr val="accent1"/>
+          </a:lnRef>
+          <a:fillRef idx="0">
+            <a:schemeClr val="accent1"/>
+          </a:fillRef>
+          <a:effectRef idx="0">
+            <a:schemeClr val="accent1"/>
+          </a:effectRef>
+          <a:fontRef idx="minor">
+            <a:schemeClr val="tx1"/>
+          </a:fontRef>
+        </p:style>
+      </p:cxnSp>
+      <p:sp>
+        <p:nvSpPr>
+          <p:cNvPr id="8" name="TextBox 7">
+            <a:extLst>
+              <a:ext uri="{FF2B5EF4-FFF2-40B4-BE49-F238E27FC236}">
+                <a16:creationId xmlns:a16="http://schemas.microsoft.com/office/drawing/2014/main" id="{0FA67A8B-DEE4-F51D-4AAE-9E9741D0DB4B}"/>
               </a:ext>
             </a:extLst>
           </p:cNvPr>
@@ -5227,8 +5667,8 @@
         </p:nvSpPr>
         <p:spPr>
           <a:xfrm>
-            <a:off x="4256598" y="3706191"/>
-            <a:ext cx="2467535" cy="369332"/>
+            <a:off x="5693255" y="3402066"/>
+            <a:ext cx="1759841" cy="369332"/>
           </a:xfrm>
           <a:prstGeom prst="rect">
             <a:avLst/>
@@ -5253,7 +5693,7 @@
           <a:p>
             <a:r>
               <a:rPr lang="en-US" dirty="0"/>
-              <a:t>[Viz] Sampled Subregion</a:t>
+              <a:t>[Viz] Spot Layout</a:t>
             </a:r>
             <a:endParaRPr lang="en-CA" dirty="0"/>
           </a:p>
@@ -5261,10 +5701,10 @@
       </p:sp>
       <p:sp>
         <p:nvSpPr>
-          <p:cNvPr id="54" name="TextBox 53">
-            <a:extLst>
-              <a:ext uri="{FF2B5EF4-FFF2-40B4-BE49-F238E27FC236}">
-                <a16:creationId xmlns:a16="http://schemas.microsoft.com/office/drawing/2014/main" id="{BE29B00D-E8DD-ABA2-DFF4-4C678BC8157C}"/>
+          <p:cNvPr id="9" name="TextBox 8">
+            <a:extLst>
+              <a:ext uri="{FF2B5EF4-FFF2-40B4-BE49-F238E27FC236}">
+                <a16:creationId xmlns:a16="http://schemas.microsoft.com/office/drawing/2014/main" id="{4B8279EF-7B21-5C89-BF51-48F60DF1C8E8}"/>
               </a:ext>
             </a:extLst>
           </p:cNvPr>
@@ -5273,8 +5713,8 @@
         </p:nvSpPr>
         <p:spPr>
           <a:xfrm>
-            <a:off x="9020712" y="4650106"/>
-            <a:ext cx="1686680" cy="369332"/>
+            <a:off x="5693255" y="2500425"/>
+            <a:ext cx="2209707" cy="369332"/>
           </a:xfrm>
           <a:prstGeom prst="rect">
             <a:avLst/>
@@ -5299,7 +5739,11 @@
           <a:p>
             <a:r>
               <a:rPr lang="en-US" dirty="0"/>
-              <a:t>[Viz] Spot Signal</a:t>
+              <a:t>[Viz] Result </a:t>
+            </a:r>
+            <a:r>
+              <a:rPr lang="en-US" dirty="0" err="1"/>
+              <a:t>SubImage</a:t>
             </a:r>
             <a:endParaRPr lang="en-CA" dirty="0"/>
           </a:p>
@@ -5319,7 +5763,7 @@
         </p:nvSpPr>
         <p:spPr>
           <a:xfrm>
-            <a:off x="10043490" y="3600784"/>
+            <a:off x="3123228" y="3247682"/>
             <a:ext cx="1860253" cy="369332"/>
           </a:xfrm>
           <a:prstGeom prst="rect">
@@ -5351,6 +5795,94 @@
           </a:p>
         </p:txBody>
       </p:sp>
+      <p:sp>
+        <p:nvSpPr>
+          <p:cNvPr id="204" name="TextBox 203">
+            <a:extLst>
+              <a:ext uri="{FF2B5EF4-FFF2-40B4-BE49-F238E27FC236}">
+                <a16:creationId xmlns:a16="http://schemas.microsoft.com/office/drawing/2014/main" id="{69F74318-75AF-0C2D-499F-DE3ACBBDE4DB}"/>
+              </a:ext>
+            </a:extLst>
+          </p:cNvPr>
+          <p:cNvSpPr txBox="1"/>
+          <p:nvPr/>
+        </p:nvSpPr>
+        <p:spPr>
+          <a:xfrm>
+            <a:off x="7292598" y="6035701"/>
+            <a:ext cx="1959254" cy="369332"/>
+          </a:xfrm>
+          <a:prstGeom prst="rect">
+            <a:avLst/>
+          </a:prstGeom>
+          <a:solidFill>
+            <a:schemeClr val="accent5">
+              <a:lumMod val="60000"/>
+              <a:lumOff val="40000"/>
+            </a:schemeClr>
+          </a:solidFill>
+          <a:ln w="28575">
+            <a:solidFill>
+              <a:srgbClr val="7030A0"/>
+            </a:solidFill>
+          </a:ln>
+        </p:spPr>
+        <p:txBody>
+          <a:bodyPr wrap="none" rtlCol="0">
+            <a:spAutoFit/>
+          </a:bodyPr>
+          <a:lstStyle/>
+          <a:p>
+            <a:r>
+              <a:rPr lang="en-US" dirty="0"/>
+              <a:t>Image Metrics Calc</a:t>
+            </a:r>
+            <a:endParaRPr lang="en-CA" dirty="0"/>
+          </a:p>
+        </p:txBody>
+      </p:sp>
+      <p:cxnSp>
+        <p:nvCxnSpPr>
+          <p:cNvPr id="206" name="Straight Arrow Connector 205">
+            <a:extLst>
+              <a:ext uri="{FF2B5EF4-FFF2-40B4-BE49-F238E27FC236}">
+                <a16:creationId xmlns:a16="http://schemas.microsoft.com/office/drawing/2014/main" id="{AF74BD63-8906-139B-3985-EA61B568F3E8}"/>
+              </a:ext>
+            </a:extLst>
+          </p:cNvPr>
+          <p:cNvCxnSpPr>
+            <a:stCxn id="59" idx="2"/>
+            <a:endCxn id="204" idx="0"/>
+          </p:cNvCxnSpPr>
+          <p:nvPr/>
+        </p:nvCxnSpPr>
+        <p:spPr>
+          <a:xfrm>
+            <a:off x="6754590" y="5434286"/>
+            <a:ext cx="1517635" cy="601415"/>
+          </a:xfrm>
+          <a:prstGeom prst="straightConnector1">
+            <a:avLst/>
+          </a:prstGeom>
+          <a:ln>
+            <a:tailEnd type="triangle"/>
+          </a:ln>
+        </p:spPr>
+        <p:style>
+          <a:lnRef idx="1">
+            <a:schemeClr val="accent1"/>
+          </a:lnRef>
+          <a:fillRef idx="0">
+            <a:schemeClr val="accent1"/>
+          </a:fillRef>
+          <a:effectRef idx="0">
+            <a:schemeClr val="accent1"/>
+          </a:effectRef>
+          <a:fontRef idx="minor">
+            <a:schemeClr val="tx1"/>
+          </a:fontRef>
+        </p:style>
+      </p:cxnSp>
     </p:spTree>
     <p:extLst>
       <p:ext uri="{BB962C8B-B14F-4D97-AF65-F5344CB8AC3E}">

</xml_diff>